<commit_message>
mid eval ppt updated
</commit_message>
<xml_diff>
--- a/documents/Mid_Eval_Slides.pptx
+++ b/documents/Mid_Eval_Slides.pptx
@@ -8942,8 +8942,8 @@
         </p:nvSpPr>
         <p:spPr>
           <a:xfrm>
-            <a:off x="311700" y="3890400"/>
-            <a:ext cx="8520600" cy="706200"/>
+            <a:off x="227700" y="3934325"/>
+            <a:ext cx="8916300" cy="1060200"/>
           </a:xfrm>
           <a:prstGeom prst="rect">
             <a:avLst/>
@@ -8968,8 +8968,53 @@
               <a:buNone/>
             </a:pPr>
             <a:r>
+              <a:t/>
+            </a:r>
+            <a:endParaRPr/>
+          </a:p>
+          <a:p>
+            <a:pPr indent="0" lvl="0" marL="0" rtl="0" algn="ctr">
+              <a:lnSpc>
+                <a:spcPct val="115000"/>
+              </a:lnSpc>
+              <a:spcBef>
+                <a:spcPts val="1600"/>
+              </a:spcBef>
+              <a:spcAft>
+                <a:spcPts val="0"/>
+              </a:spcAft>
+              <a:buNone/>
+            </a:pPr>
+            <a:r>
               <a:rPr lang="en-GB"/>
               <a:t>Team: ProximaCentauri</a:t>
+            </a:r>
+            <a:endParaRPr/>
+          </a:p>
+          <a:p>
+            <a:pPr indent="0" lvl="0" marL="0" rtl="0" algn="ctr">
+              <a:lnSpc>
+                <a:spcPct val="115000"/>
+              </a:lnSpc>
+              <a:spcBef>
+                <a:spcPts val="1600"/>
+              </a:spcBef>
+              <a:spcAft>
+                <a:spcPts val="0"/>
+              </a:spcAft>
+              <a:buNone/>
+            </a:pPr>
+            <a:r>
+              <a:rPr lang="en-GB"/>
+              <a:t>Abhinaba Bala(2020701001)</a:t>
+            </a:r>
+            <a:r>
+              <a:rPr lang="en-GB"/>
+              <a:t>, </a:t>
+            </a:r>
+            <a:r>
+              <a:rPr lang="en-GB"/>
+              <a:t>Neel Mishra(2020701009), Ritam Basu(2020701005), Jigyasu Khandelwal(2020702013)</a:t>
             </a:r>
             <a:endParaRPr/>
           </a:p>
@@ -9245,72 +9290,55 @@
           </a:bodyPr>
           <a:lstStyle/>
           <a:p>
-            <a:pPr indent="-342900" lvl="0" marL="457200" rtl="0" algn="l">
-              <a:spcBef>
-                <a:spcPts val="0"/>
-              </a:spcBef>
-              <a:spcAft>
-                <a:spcPts val="0"/>
-              </a:spcAft>
-              <a:buSzPts val="1800"/>
+            <a:pPr indent="-381000" lvl="0" marL="457200" rtl="0" algn="l">
+              <a:spcBef>
+                <a:spcPts val="0"/>
+              </a:spcBef>
+              <a:spcAft>
+                <a:spcPts val="0"/>
+              </a:spcAft>
+              <a:buSzPts val="2400"/>
               <a:buChar char="●"/>
             </a:pPr>
             <a:r>
-              <a:rPr lang="en-GB"/>
-              <a:t>Motion blur is a phenomena which is caused by the movement of object or camera at the time of triggering of camera shutter.</a:t>
+              <a:rPr lang="en-GB" sz="2400"/>
+              <a:t>Motion blur is a phenomena which is caused by the movement of object or camera shake at the time of triggering of camera shutter.</a:t>
             </a:r>
-            <a:endParaRPr/>
+            <a:endParaRPr sz="2400"/>
           </a:p>
           <a:p>
-            <a:pPr indent="-342900" lvl="0" marL="457200" rtl="0" algn="l">
-              <a:spcBef>
-                <a:spcPts val="0"/>
-              </a:spcBef>
-              <a:spcAft>
-                <a:spcPts val="0"/>
-              </a:spcAft>
-              <a:buSzPts val="1800"/>
+            <a:pPr indent="-381000" lvl="0" marL="457200" rtl="0" algn="l">
+              <a:spcBef>
+                <a:spcPts val="0"/>
+              </a:spcBef>
+              <a:spcAft>
+                <a:spcPts val="0"/>
+              </a:spcAft>
+              <a:buSzPts val="2400"/>
               <a:buChar char="●"/>
             </a:pPr>
             <a:r>
-              <a:rPr lang="en-GB"/>
-              <a:t>We propose a way to restore image which is free from motion blur.</a:t>
+              <a:rPr lang="en-GB" sz="2400"/>
+              <a:t>The paper proposes a way to deblur the image.</a:t>
             </a:r>
-            <a:endParaRPr/>
+            <a:endParaRPr sz="2400"/>
           </a:p>
           <a:p>
-            <a:pPr indent="-342900" lvl="0" marL="457200" rtl="0" algn="l">
-              <a:spcBef>
-                <a:spcPts val="0"/>
-              </a:spcBef>
-              <a:spcAft>
-                <a:spcPts val="0"/>
-              </a:spcAft>
-              <a:buSzPts val="1800"/>
+            <a:pPr indent="-381000" lvl="0" marL="457200" rtl="0" algn="l">
+              <a:spcBef>
+                <a:spcPts val="0"/>
+              </a:spcBef>
+              <a:spcAft>
+                <a:spcPts val="0"/>
+              </a:spcAft>
+              <a:buSzPts val="2400"/>
               <a:buChar char="●"/>
             </a:pPr>
             <a:r>
-              <a:rPr lang="en-GB"/>
-              <a:t>We do this by firstly proposing a model for motion blur for object  and getting along that expression to reach a end result which provides us an useful result.</a:t>
+              <a:rPr lang="en-GB" sz="2400"/>
+              <a:t>It is done by proposing a model for motion blur using transparency.</a:t>
             </a:r>
-            <a:endParaRPr/>
-          </a:p>
-          <a:p>
-            <a:pPr indent="-342900" lvl="0" marL="457200" rtl="0" algn="l">
-              <a:spcBef>
-                <a:spcPts val="0"/>
-              </a:spcBef>
-              <a:spcAft>
-                <a:spcPts val="0"/>
-              </a:spcAft>
-              <a:buSzPts val="1800"/>
-              <a:buChar char="●"/>
-            </a:pPr>
-            <a:r>
-              <a:rPr lang="en-GB"/>
-              <a:t>We then translate this model to camera blur which is the result of movement of camera at the time of shuttering.</a:t>
-            </a:r>
-            <a:endParaRPr/>
+            <a:endParaRPr sz="2400"/>
           </a:p>
         </p:txBody>
       </p:sp>
@@ -9549,7 +9577,7 @@
                 <a:cs typeface="Source Code Pro"/>
                 <a:sym typeface="Source Code Pro"/>
               </a:rPr>
-              <a:t>The previously proposed model for image deblurring mainly were centred on solving an equation</a:t>
+              <a:t>The previously proposed model for image deblurring are mainly centred on solving an equation</a:t>
             </a:r>
             <a:endParaRPr sz="1800">
               <a:latin typeface="Source Code Pro"/>
@@ -9643,7 +9671,7 @@
                 <a:cs typeface="Source Code Pro"/>
                 <a:sym typeface="Source Code Pro"/>
               </a:rPr>
-              <a:t>The main concern regarding this method is restoring the still image containing motion blur as the background may not undergo same motion blur.</a:t>
+              <a:t>The main concern regarding restoring a still image containing motion blur is that the background may not undergo the same motion blur.</a:t>
             </a:r>
             <a:endParaRPr sz="1800">
               <a:latin typeface="Source Code Pro"/>
@@ -9697,7 +9725,7 @@
                 <a:cs typeface="Source Code Pro"/>
                 <a:sym typeface="Source Code Pro"/>
               </a:rPr>
-              <a:t>Hence we use the notion of transparency.</a:t>
+              <a:t>The notion of transparency will help in resolving this.</a:t>
             </a:r>
             <a:endParaRPr sz="1800">
               <a:latin typeface="Source Code Pro"/>
@@ -9916,19 +9944,19 @@
           </a:bodyPr>
           <a:lstStyle/>
           <a:p>
-            <a:pPr indent="-317500" lvl="0" marL="457200" rtl="0" algn="l">
-              <a:spcBef>
-                <a:spcPts val="0"/>
-              </a:spcBef>
-              <a:spcAft>
-                <a:spcPts val="0"/>
-              </a:spcAft>
-              <a:buSzPts val="1400"/>
+            <a:pPr indent="-330200" lvl="0" marL="457200" rtl="0" algn="l">
+              <a:spcBef>
+                <a:spcPts val="0"/>
+              </a:spcBef>
+              <a:spcAft>
+                <a:spcPts val="0"/>
+              </a:spcAft>
+              <a:buSzPts val="1600"/>
               <a:buFont typeface="Source Code Pro"/>
               <a:buChar char="●"/>
             </a:pPr>
             <a:r>
-              <a:rPr lang="en-GB">
+              <a:rPr lang="en-GB" sz="1600">
                 <a:latin typeface="Source Code Pro"/>
                 <a:ea typeface="Source Code Pro"/>
                 <a:cs typeface="Source Code Pro"/>
@@ -9936,7 +9964,7 @@
               </a:rPr>
               <a:t>Transparency is the proportion of time that the background is exposed. </a:t>
             </a:r>
-            <a:endParaRPr>
+            <a:endParaRPr sz="1600">
               <a:latin typeface="Source Code Pro"/>
               <a:ea typeface="Source Code Pro"/>
               <a:cs typeface="Source Code Pro"/>
@@ -9956,7 +9984,7 @@
             <a:r>
               <a:t/>
             </a:r>
-            <a:endParaRPr>
+            <a:endParaRPr sz="1600">
               <a:latin typeface="Source Code Pro"/>
               <a:ea typeface="Source Code Pro"/>
               <a:cs typeface="Source Code Pro"/>
@@ -9976,7 +10004,7 @@
             <a:r>
               <a:t/>
             </a:r>
-            <a:endParaRPr>
+            <a:endParaRPr sz="1600">
               <a:latin typeface="Source Code Pro"/>
               <a:ea typeface="Source Code Pro"/>
               <a:cs typeface="Source Code Pro"/>
@@ -9984,19 +10012,19 @@
             </a:endParaRPr>
           </a:p>
           <a:p>
-            <a:pPr indent="-317500" lvl="0" marL="457200" rtl="0" algn="l">
-              <a:spcBef>
-                <a:spcPts val="0"/>
-              </a:spcBef>
-              <a:spcAft>
-                <a:spcPts val="0"/>
-              </a:spcAft>
-              <a:buSzPts val="1400"/>
+            <a:pPr indent="-330200" lvl="0" marL="457200" rtl="0" algn="l">
+              <a:spcBef>
+                <a:spcPts val="0"/>
+              </a:spcBef>
+              <a:spcAft>
+                <a:spcPts val="0"/>
+              </a:spcAft>
+              <a:buSzPts val="1600"/>
               <a:buFont typeface="Source Code Pro"/>
               <a:buChar char="●"/>
             </a:pPr>
             <a:r>
-              <a:rPr lang="en-GB">
+              <a:rPr lang="en-GB" sz="1600">
                 <a:latin typeface="Source Code Pro"/>
                 <a:ea typeface="Source Code Pro"/>
                 <a:cs typeface="Source Code Pro"/>
@@ -10004,7 +10032,7 @@
               </a:rPr>
               <a:t>We use transparency to model the blur filter.</a:t>
             </a:r>
-            <a:endParaRPr>
+            <a:endParaRPr sz="1600">
               <a:latin typeface="Source Code Pro"/>
               <a:ea typeface="Source Code Pro"/>
               <a:cs typeface="Source Code Pro"/>
@@ -10024,7 +10052,7 @@
             <a:r>
               <a:t/>
             </a:r>
-            <a:endParaRPr>
+            <a:endParaRPr sz="1600">
               <a:latin typeface="Source Code Pro"/>
               <a:ea typeface="Source Code Pro"/>
               <a:cs typeface="Source Code Pro"/>
@@ -10044,7 +10072,7 @@
             <a:r>
               <a:t/>
             </a:r>
-            <a:endParaRPr>
+            <a:endParaRPr sz="1600">
               <a:latin typeface="Source Code Pro"/>
               <a:ea typeface="Source Code Pro"/>
               <a:cs typeface="Source Code Pro"/>
@@ -10052,19 +10080,19 @@
             </a:endParaRPr>
           </a:p>
           <a:p>
-            <a:pPr indent="-317500" lvl="0" marL="457200" rtl="0" algn="l">
-              <a:spcBef>
-                <a:spcPts val="0"/>
-              </a:spcBef>
-              <a:spcAft>
-                <a:spcPts val="0"/>
-              </a:spcAft>
-              <a:buSzPts val="1400"/>
+            <a:pPr indent="-330200" lvl="0" marL="457200" rtl="0" algn="l">
+              <a:spcBef>
+                <a:spcPts val="0"/>
+              </a:spcBef>
+              <a:spcAft>
+                <a:spcPts val="0"/>
+              </a:spcAft>
+              <a:buSzPts val="1600"/>
               <a:buFont typeface="Source Code Pro"/>
               <a:buChar char="●"/>
             </a:pPr>
             <a:r>
-              <a:rPr lang="en-GB">
+              <a:rPr lang="en-GB" sz="1600">
                 <a:latin typeface="Source Code Pro"/>
                 <a:ea typeface="Source Code Pro"/>
                 <a:cs typeface="Source Code Pro"/>
@@ -10073,7 +10101,7 @@
               <a:t>  </a:t>
             </a:r>
             <a:r>
-              <a:rPr lang="en-GB">
+              <a:rPr lang="en-GB" sz="1600">
                 <a:latin typeface="Source Code Pro"/>
                 <a:ea typeface="Source Code Pro"/>
                 <a:cs typeface="Source Code Pro"/>
@@ -10081,7 +10109,7 @@
               </a:rPr>
               <a:t>defines transparency corresponding to blurred image pixels. </a:t>
             </a:r>
-            <a:endParaRPr>
+            <a:endParaRPr sz="1600">
               <a:latin typeface="Source Code Pro"/>
               <a:ea typeface="Source Code Pro"/>
               <a:cs typeface="Source Code Pro"/>
@@ -10101,7 +10129,7 @@
             <a:r>
               <a:t/>
             </a:r>
-            <a:endParaRPr>
+            <a:endParaRPr sz="1600">
               <a:latin typeface="Source Code Pro"/>
               <a:ea typeface="Source Code Pro"/>
               <a:cs typeface="Source Code Pro"/>
@@ -10109,19 +10137,19 @@
             </a:endParaRPr>
           </a:p>
           <a:p>
-            <a:pPr indent="-317500" lvl="0" marL="457200" rtl="0" algn="l">
-              <a:spcBef>
-                <a:spcPts val="0"/>
-              </a:spcBef>
-              <a:spcAft>
-                <a:spcPts val="0"/>
-              </a:spcAft>
-              <a:buSzPts val="1400"/>
+            <a:pPr indent="-330200" lvl="0" marL="457200" rtl="0" algn="l">
+              <a:spcBef>
+                <a:spcPts val="0"/>
+              </a:spcBef>
+              <a:spcAft>
+                <a:spcPts val="0"/>
+              </a:spcAft>
+              <a:buSzPts val="1600"/>
               <a:buFont typeface="Source Code Pro"/>
               <a:buChar char="●"/>
             </a:pPr>
             <a:r>
-              <a:rPr lang="en-GB">
+              <a:rPr lang="en-GB" sz="1600">
                 <a:latin typeface="Source Code Pro"/>
                 <a:ea typeface="Source Code Pro"/>
                 <a:cs typeface="Source Code Pro"/>
@@ -10129,7 +10157,7 @@
               </a:rPr>
               <a:t>  defines transparency values corresponding to non blurred image pixels. </a:t>
             </a:r>
-            <a:endParaRPr>
+            <a:endParaRPr sz="1600">
               <a:latin typeface="Source Code Pro"/>
               <a:ea typeface="Source Code Pro"/>
               <a:cs typeface="Source Code Pro"/>
@@ -10149,7 +10177,7 @@
             <a:r>
               <a:t/>
             </a:r>
-            <a:endParaRPr>
+            <a:endParaRPr sz="1600">
               <a:latin typeface="Source Code Pro"/>
               <a:ea typeface="Source Code Pro"/>
               <a:cs typeface="Source Code Pro"/>
@@ -10174,8 +10202,8 @@
         </p:blipFill>
         <p:spPr>
           <a:xfrm>
-            <a:off x="1199625" y="3336575"/>
-            <a:ext cx="142875" cy="104775"/>
+            <a:off x="803725" y="3247175"/>
+            <a:ext cx="229025" cy="167952"/>
           </a:xfrm>
           <a:prstGeom prst="rect">
             <a:avLst/>
@@ -10202,8 +10230,8 @@
         </p:blipFill>
         <p:spPr>
           <a:xfrm>
-            <a:off x="1190100" y="4180150"/>
-            <a:ext cx="161925" cy="104775"/>
+            <a:off x="788463" y="4192925"/>
+            <a:ext cx="259559" cy="167950"/>
           </a:xfrm>
           <a:prstGeom prst="rect">
             <a:avLst/>
@@ -10338,7 +10366,7 @@
         </p:blipFill>
         <p:spPr>
           <a:xfrm>
-            <a:off x="2482838" y="4415025"/>
+            <a:off x="2482850" y="3926725"/>
             <a:ext cx="4467225" cy="552450"/>
           </a:xfrm>
           <a:prstGeom prst="rect">
@@ -10393,7 +10421,7 @@
                 <a:cs typeface="Source Code Pro"/>
                 <a:sym typeface="Source Code Pro"/>
               </a:rPr>
-              <a:t>A formulation of motion blur from transparency point of view. </a:t>
+              <a:t>A formulation of motion blur from transparency point of view can be given as: </a:t>
             </a:r>
             <a:endParaRPr sz="2400">
               <a:latin typeface="Source Code Pro"/>
@@ -10432,8 +10460,8 @@
         </p:nvSpPr>
         <p:spPr>
           <a:xfrm>
-            <a:off x="311713" y="2993350"/>
-            <a:ext cx="8809500" cy="638100"/>
+            <a:off x="311725" y="2529775"/>
+            <a:ext cx="8809500" cy="1101600"/>
           </a:xfrm>
           <a:prstGeom prst="rect">
             <a:avLst/>
@@ -10925,7 +10953,7 @@
                 <a:cs typeface="Source Code Pro"/>
                 <a:sym typeface="Source Code Pro"/>
               </a:rPr>
-              <a:t>The aim here is to estimate the blur filter by camera shake.</a:t>
+              <a:t>The aim here is to estimate the blur filter due to camera shake.</a:t>
             </a:r>
             <a:endParaRPr sz="2400">
               <a:latin typeface="Source Code Pro"/>
@@ -10973,7 +11001,7 @@
                 <a:cs typeface="Source Code Pro"/>
                 <a:sym typeface="Source Code Pro"/>
               </a:rPr>
-              <a:t>Not the entire image is required be taken into computation.</a:t>
+              <a:t>The entire image is not required to be taken into computation.</a:t>
             </a:r>
             <a:endParaRPr sz="2400">
               <a:latin typeface="Source Code Pro"/>

</xml_diff>